<commit_message>
tweaks in design; offline.html added
</commit_message>
<xml_diff>
--- a/rails/public/favicon/lambda1_fat_circle.pptx
+++ b/rails/public/favicon/lambda1_fat_circle.pptx
@@ -3007,14 +3007,14 @@
                   </a:schemeClr>
                 </a:gs>
                 <a:gs pos="0">
-                  <a:srgbClr val="910002"/>
+                  <a:srgbClr val="FF0000"/>
                 </a:gs>
                 <a:gs pos="100000">
-                  <a:srgbClr val="57257F"/>
+                  <a:srgbClr val="AA4AFF"/>
                 </a:gs>
                 <a:gs pos="52000">
                   <a:schemeClr val="accent6">
-                    <a:lumMod val="75000"/>
+                    <a:lumMod val="50000"/>
                   </a:schemeClr>
                 </a:gs>
               </a:gsLst>
@@ -3069,6 +3069,9 @@
             <a:avLst/>
           </a:prstGeom>
           <a:noFill/>
+          <a:ln>
+            <a:noFill/>
+          </a:ln>
         </p:spPr>
         <p:txBody>
           <a:bodyPr wrap="none" rtlCol="0">

</xml_diff>